<commit_message>
Correct False Switch/Case Statement.
</commit_message>
<xml_diff>
--- a/files/resources/cpp/ch1/chads-cpp-ch1.pptx
+++ b/files/resources/cpp/ch1/chads-cpp-ch1.pptx
@@ -6586,13 +6586,6 @@
   <p:transition spd="slow">
     <p:cut/>
   </p:transition>
-  <p:timing>
-    <p:tnLst>
-      <p:par>
-        <p:cTn id="1" dur="indefinite" restart="never" nodeType="tmRoot"/>
-      </p:par>
-    </p:tnLst>
-  </p:timing>
 </p:sld>
 </file>
 
@@ -7826,13 +7819,6 @@
   <p:transition spd="slow">
     <p:cut/>
   </p:transition>
-  <p:timing>
-    <p:tnLst>
-      <p:par>
-        <p:cTn id="1" dur="indefinite" restart="never" nodeType="tmRoot"/>
-      </p:par>
-    </p:tnLst>
-  </p:timing>
 </p:sld>
 </file>
 
@@ -7937,13 +7923,6 @@
   <p:transition spd="slow">
     <p:cut/>
   </p:transition>
-  <p:timing>
-    <p:tnLst>
-      <p:par>
-        <p:cTn id="1" dur="indefinite" restart="never" nodeType="tmRoot"/>
-      </p:par>
-    </p:tnLst>
-  </p:timing>
 </p:sld>
 </file>
 
@@ -8220,13 +8199,6 @@
   <p:transition spd="slow">
     <p:cut/>
   </p:transition>
-  <p:timing>
-    <p:tnLst>
-      <p:par>
-        <p:cTn id="1" dur="indefinite" restart="never" nodeType="tmRoot"/>
-      </p:par>
-    </p:tnLst>
-  </p:timing>
 </p:sld>
 </file>
 
@@ -8317,41 +8289,57 @@
               <a:buNone/>
             </a:pPr>
             <a:r>
-              <a:rPr lang="en"/>
-              <a:t>A switch statement allows you to test a list of values for one variable. The variable being tested is called the </a:t>
+              <a:rPr lang="en" dirty="0"/>
+              <a:t>A switch statement allows you to test a list of values for one </a:t>
             </a:r>
             <a:r>
-              <a:rPr lang="en" b="1"/>
+              <a:rPr lang="en" dirty="0" smtClean="0"/>
+              <a:t>constant such as an integer. </a:t>
+            </a:r>
+            <a:r>
+              <a:rPr lang="en" dirty="0"/>
+              <a:t>The variable being tested is called the </a:t>
+            </a:r>
+            <a:r>
+              <a:rPr lang="en" b="1" dirty="0"/>
               <a:t>Switch</a:t>
             </a:r>
             <a:r>
-              <a:rPr lang="en"/>
+              <a:rPr lang="en" dirty="0"/>
               <a:t>, and the possible values being tested is called a </a:t>
             </a:r>
             <a:r>
-              <a:rPr lang="en" b="1"/>
+              <a:rPr lang="en" b="1" dirty="0"/>
               <a:t>Case</a:t>
             </a:r>
             <a:r>
-              <a:rPr lang="en"/>
+              <a:rPr lang="en" dirty="0"/>
               <a:t>. After a case is executed you’ll want to </a:t>
             </a:r>
             <a:r>
-              <a:rPr lang="en" b="1"/>
+              <a:rPr lang="en" b="1" dirty="0"/>
               <a:t>Break</a:t>
             </a:r>
             <a:r>
-              <a:rPr lang="en"/>
+              <a:rPr lang="en" dirty="0"/>
               <a:t>, telling your program to stop testing other values. You can also include the optional </a:t>
             </a:r>
             <a:r>
-              <a:rPr lang="en" b="1"/>
+              <a:rPr lang="en" b="1" dirty="0"/>
               <a:t>Default </a:t>
             </a:r>
             <a:r>
-              <a:rPr lang="en"/>
-              <a:t>case which acts like an “else” statement and executes itself if all cases are false. Keep in mind that the default case can only appear at the end of a Switch statement and no “break” is needed.</a:t>
+              <a:rPr lang="en" dirty="0"/>
+              <a:t>case which acts like an “else” statement and executes itself if all cases are false. Keep in mind that the default case </a:t>
             </a:r>
+            <a:r>
+              <a:rPr lang="en" dirty="0" smtClean="0"/>
+              <a:t>should(But doesn’t have  to) </a:t>
+            </a:r>
+            <a:r>
+              <a:rPr lang="en" dirty="0"/>
+              <a:t>appear at the end of a Switch statement and no “break” is needed.</a:t>
+            </a:r>
           </a:p>
           <a:p>
             <a:pPr lvl="0">
@@ -8361,7 +8349,7 @@
               <a:buNone/>
             </a:pPr>
             <a:r>
-              <a:rPr lang="en" b="1" u="sng"/>
+              <a:rPr lang="en" b="1" u="sng" dirty="0"/>
               <a:t>You Should be able to complete Chapter 1-4 now.</a:t>
             </a:r>
           </a:p>
@@ -8479,13 +8467,6 @@
   <p:transition spd="slow">
     <p:cut/>
   </p:transition>
-  <p:timing>
-    <p:tnLst>
-      <p:par>
-        <p:cTn id="1" dur="indefinite" restart="never" nodeType="tmRoot"/>
-      </p:par>
-    </p:tnLst>
-  </p:timing>
 </p:sld>
 </file>
 
@@ -8689,13 +8670,6 @@
   <p:transition spd="slow">
     <p:cut/>
   </p:transition>
-  <p:timing>
-    <p:tnLst>
-      <p:par>
-        <p:cTn id="1" dur="indefinite" restart="never" nodeType="tmRoot"/>
-      </p:par>
-    </p:tnLst>
-  </p:timing>
 </p:sld>
 </file>
 
@@ -8800,13 +8774,6 @@
   <p:transition spd="slow">
     <p:cut/>
   </p:transition>
-  <p:timing>
-    <p:tnLst>
-      <p:par>
-        <p:cTn id="1" dur="indefinite" restart="never" nodeType="tmRoot"/>
-      </p:par>
-    </p:tnLst>
-  </p:timing>
 </p:sld>
 </file>
 
@@ -8911,13 +8878,6 @@
   <p:transition spd="slow">
     <p:cut/>
   </p:transition>
-  <p:timing>
-    <p:tnLst>
-      <p:par>
-        <p:cTn id="1" dur="indefinite" restart="never" nodeType="tmRoot"/>
-      </p:par>
-    </p:tnLst>
-  </p:timing>
 </p:sld>
 </file>
 
@@ -9046,13 +9006,6 @@
   <p:transition spd="slow">
     <p:cut/>
   </p:transition>
-  <p:timing>
-    <p:tnLst>
-      <p:par>
-        <p:cTn id="1" dur="indefinite" restart="never" nodeType="tmRoot"/>
-      </p:par>
-    </p:tnLst>
-  </p:timing>
 </p:sld>
 </file>
 

</xml_diff>